<commit_message>
FInished off the El phi E plot and fixed a bug where my functions were scaling the histograms twice. A word of warning for the futire is never to scale a histogram in a single function, otherwise your might end up scaling twice. Also updated some plots umoungst other minor fixes.
</commit_message>
<xml_diff>
--- a/plots/Updated Phase Space Plots.pptx
+++ b/plots/Updated Phase Space Plots.pptx
@@ -106,6 +106,11 @@
       </a:defRPr>
     </a:lvl9pPr>
   </p:defaultTextStyle>
+  <p:extLst>
+    <p:ext uri="{EFAFB233-063F-42B5-8137-9DF3F51BA10A}">
+      <p15:sldGuideLst xmlns:p15="http://schemas.microsoft.com/office/powerpoint/2012/main"/>
+    </p:ext>
+  </p:extLst>
 </p:presentation>
 </file>
 
@@ -258,7 +263,7 @@
           <a:p>
             <a:fld id="{C0CFEFE4-7B0A-4C4B-8E8A-64DA77ACFEEA}" type="datetimeFigureOut">
               <a:rPr lang="en-GB" smtClean="0"/>
-              <a:t>06/08/2018</a:t>
+              <a:t>07/08/2018</a:t>
             </a:fld>
             <a:endParaRPr lang="en-GB"/>
           </a:p>
@@ -458,7 +463,7 @@
           <a:p>
             <a:fld id="{C0CFEFE4-7B0A-4C4B-8E8A-64DA77ACFEEA}" type="datetimeFigureOut">
               <a:rPr lang="en-GB" smtClean="0"/>
-              <a:t>06/08/2018</a:t>
+              <a:t>07/08/2018</a:t>
             </a:fld>
             <a:endParaRPr lang="en-GB"/>
           </a:p>
@@ -668,7 +673,7 @@
           <a:p>
             <a:fld id="{C0CFEFE4-7B0A-4C4B-8E8A-64DA77ACFEEA}" type="datetimeFigureOut">
               <a:rPr lang="en-GB" smtClean="0"/>
-              <a:t>06/08/2018</a:t>
+              <a:t>07/08/2018</a:t>
             </a:fld>
             <a:endParaRPr lang="en-GB"/>
           </a:p>
@@ -868,7 +873,7 @@
           <a:p>
             <a:fld id="{C0CFEFE4-7B0A-4C4B-8E8A-64DA77ACFEEA}" type="datetimeFigureOut">
               <a:rPr lang="en-GB" smtClean="0"/>
-              <a:t>06/08/2018</a:t>
+              <a:t>07/08/2018</a:t>
             </a:fld>
             <a:endParaRPr lang="en-GB"/>
           </a:p>
@@ -1144,7 +1149,7 @@
           <a:p>
             <a:fld id="{C0CFEFE4-7B0A-4C4B-8E8A-64DA77ACFEEA}" type="datetimeFigureOut">
               <a:rPr lang="en-GB" smtClean="0"/>
-              <a:t>06/08/2018</a:t>
+              <a:t>07/08/2018</a:t>
             </a:fld>
             <a:endParaRPr lang="en-GB"/>
           </a:p>
@@ -1412,7 +1417,7 @@
           <a:p>
             <a:fld id="{C0CFEFE4-7B0A-4C4B-8E8A-64DA77ACFEEA}" type="datetimeFigureOut">
               <a:rPr lang="en-GB" smtClean="0"/>
-              <a:t>06/08/2018</a:t>
+              <a:t>07/08/2018</a:t>
             </a:fld>
             <a:endParaRPr lang="en-GB"/>
           </a:p>
@@ -1827,7 +1832,7 @@
           <a:p>
             <a:fld id="{C0CFEFE4-7B0A-4C4B-8E8A-64DA77ACFEEA}" type="datetimeFigureOut">
               <a:rPr lang="en-GB" smtClean="0"/>
-              <a:t>06/08/2018</a:t>
+              <a:t>07/08/2018</a:t>
             </a:fld>
             <a:endParaRPr lang="en-GB"/>
           </a:p>
@@ -1969,7 +1974,7 @@
           <a:p>
             <a:fld id="{C0CFEFE4-7B0A-4C4B-8E8A-64DA77ACFEEA}" type="datetimeFigureOut">
               <a:rPr lang="en-GB" smtClean="0"/>
-              <a:t>06/08/2018</a:t>
+              <a:t>07/08/2018</a:t>
             </a:fld>
             <a:endParaRPr lang="en-GB"/>
           </a:p>
@@ -2082,7 +2087,7 @@
           <a:p>
             <a:fld id="{C0CFEFE4-7B0A-4C4B-8E8A-64DA77ACFEEA}" type="datetimeFigureOut">
               <a:rPr lang="en-GB" smtClean="0"/>
-              <a:t>06/08/2018</a:t>
+              <a:t>07/08/2018</a:t>
             </a:fld>
             <a:endParaRPr lang="en-GB"/>
           </a:p>
@@ -2395,7 +2400,7 @@
           <a:p>
             <a:fld id="{C0CFEFE4-7B0A-4C4B-8E8A-64DA77ACFEEA}" type="datetimeFigureOut">
               <a:rPr lang="en-GB" smtClean="0"/>
-              <a:t>06/08/2018</a:t>
+              <a:t>07/08/2018</a:t>
             </a:fld>
             <a:endParaRPr lang="en-GB"/>
           </a:p>
@@ -2684,7 +2689,7 @@
           <a:p>
             <a:fld id="{C0CFEFE4-7B0A-4C4B-8E8A-64DA77ACFEEA}" type="datetimeFigureOut">
               <a:rPr lang="en-GB" smtClean="0"/>
-              <a:t>06/08/2018</a:t>
+              <a:t>07/08/2018</a:t>
             </a:fld>
             <a:endParaRPr lang="en-GB"/>
           </a:p>
@@ -2927,7 +2932,7 @@
           <a:p>
             <a:fld id="{C0CFEFE4-7B0A-4C4B-8E8A-64DA77ACFEEA}" type="datetimeFigureOut">
               <a:rPr lang="en-GB" smtClean="0"/>
-              <a:t>06/08/2018</a:t>
+              <a:t>07/08/2018</a:t>
             </a:fld>
             <a:endParaRPr lang="en-GB"/>
           </a:p>
@@ -3457,10 +3462,17 @@
           <a:lstStyle/>
           <a:p>
             <a:r>
+              <a:rPr lang="en-GB" dirty="0"/>
+              <a:t>Incoming </a:t>
+            </a:r>
+            <a:r>
               <a:rPr lang="en-GB" dirty="0" err="1"/>
               <a:t>Nue</a:t>
             </a:r>
-            <a:endParaRPr lang="en-GB" dirty="0"/>
+            <a:r>
+              <a:rPr lang="en-GB" dirty="0"/>
+              <a:t> Kinematics</a:t>
+            </a:r>
           </a:p>
         </p:txBody>
       </p:sp>
@@ -3516,8 +3528,8 @@
         </p:blipFill>
         <p:spPr>
           <a:xfrm>
-            <a:off x="6522389" y="2199645"/>
-            <a:ext cx="5462303" cy="4019999"/>
+            <a:off x="6522389" y="2354966"/>
+            <a:ext cx="5462303" cy="3709357"/>
           </a:xfrm>
           <a:prstGeom prst="rect">
             <a:avLst/>
@@ -3577,7 +3589,15 @@
           <a:p>
             <a:r>
               <a:rPr lang="en-GB" dirty="0"/>
-              <a:t>Electrons</a:t>
+              <a:t>Outgoing Electron from </a:t>
+            </a:r>
+            <a:r>
+              <a:rPr lang="en-GB" dirty="0" err="1"/>
+              <a:t>Nue</a:t>
+            </a:r>
+            <a:r>
+              <a:rPr lang="en-GB" dirty="0"/>
+              <a:t> Interaction Kinematics</a:t>
             </a:r>
           </a:p>
         </p:txBody>
@@ -3605,51 +3625,43 @@
         <p:spPr>
           <a:xfrm>
             <a:off x="0" y="2342934"/>
-            <a:ext cx="6110159" cy="4149306"/>
+            <a:ext cx="6110159" cy="4149305"/>
           </a:xfrm>
           <a:prstGeom prst="rect">
             <a:avLst/>
           </a:prstGeom>
         </p:spPr>
       </p:pic>
-      <p:sp>
-        <p:nvSpPr>
-          <p:cNvPr id="8" name="TextBox 7">
-            <a:extLst>
-              <a:ext uri="{FF2B5EF4-FFF2-40B4-BE49-F238E27FC236}">
-                <a16:creationId xmlns:a16="http://schemas.microsoft.com/office/drawing/2014/main" id="{BB15844A-AA61-4649-A45E-8C76343A8EC2}"/>
-              </a:ext>
-            </a:extLst>
-          </p:cNvPr>
-          <p:cNvSpPr txBox="1"/>
+      <p:pic>
+        <p:nvPicPr>
+          <p:cNvPr id="4" name="Picture 3">
+            <a:extLst>
+              <a:ext uri="{FF2B5EF4-FFF2-40B4-BE49-F238E27FC236}">
+                <a16:creationId xmlns:a16="http://schemas.microsoft.com/office/drawing/2014/main" id="{61DA6F54-1DE0-7448-83F6-ACA9E22237E2}"/>
+              </a:ext>
+            </a:extLst>
+          </p:cNvPr>
+          <p:cNvPicPr>
+            <a:picLocks noChangeAspect="1"/>
+          </p:cNvPicPr>
           <p:nvPr/>
-        </p:nvSpPr>
+        </p:nvPicPr>
+        <p:blipFill>
+          <a:blip r:embed="rId3"/>
+          <a:stretch>
+            <a:fillRect/>
+          </a:stretch>
+        </p:blipFill>
         <p:spPr>
           <a:xfrm>
-            <a:off x="8475134" y="3955922"/>
-            <a:ext cx="2269066" cy="1200329"/>
+            <a:off x="6110159" y="2536858"/>
+            <a:ext cx="5824591" cy="3955381"/>
           </a:xfrm>
           <a:prstGeom prst="rect">
             <a:avLst/>
           </a:prstGeom>
-          <a:noFill/>
         </p:spPr>
-        <p:txBody>
-          <a:bodyPr wrap="square" rtlCol="0">
-            <a:spAutoFit/>
-          </a:bodyPr>
-          <a:lstStyle/>
-          <a:p>
-            <a:r>
-              <a:rPr lang="en-GB" dirty="0"/>
-              <a:t>I messed up on Phi (forgot to convert rad to degrees -_-)</a:t>
-            </a:r>
-          </a:p>
-          <a:p>
-            <a:endParaRPr lang="en-GB" dirty="0"/>
-          </a:p>
-        </p:txBody>
-      </p:sp>
+      </p:pic>
     </p:spTree>
     <p:extLst>
       <p:ext uri="{BB962C8B-B14F-4D97-AF65-F5344CB8AC3E}">

</xml_diff>

<commit_message>
added separate plots for even binning and not even binning and also updated the phase space of numi
</commit_message>
<xml_diff>
--- a/plots/Updated Phase Space Plots.pptx
+++ b/plots/Updated Phase Space Plots.pptx
@@ -4,10 +4,14 @@
   <p:sldMasterIdLst>
     <p:sldMasterId id="2147483648" r:id="rId1"/>
   </p:sldMasterIdLst>
+  <p:notesMasterIdLst>
+    <p:notesMasterId r:id="rId6"/>
+  </p:notesMasterIdLst>
   <p:sldIdLst>
     <p:sldId id="256" r:id="rId2"/>
     <p:sldId id="257" r:id="rId3"/>
     <p:sldId id="258" r:id="rId4"/>
+    <p:sldId id="259" r:id="rId5"/>
   </p:sldIdLst>
   <p:sldSz cx="12192000" cy="6858000"/>
   <p:notesSz cx="6858000" cy="9144000"/>
@@ -114,6 +118,440 @@
 </p:presentation>
 </file>
 
+<file path=ppt/notesMasters/notesMaster1.xml><?xml version="1.0" encoding="utf-8"?>
+<p:notesMaster xmlns:a="http://schemas.openxmlformats.org/drawingml/2006/main" xmlns:r="http://schemas.openxmlformats.org/officeDocument/2006/relationships" xmlns:p="http://schemas.openxmlformats.org/presentationml/2006/main">
+  <p:cSld>
+    <p:bg>
+      <p:bgRef idx="1001">
+        <a:schemeClr val="bg1"/>
+      </p:bgRef>
+    </p:bg>
+    <p:spTree>
+      <p:nvGrpSpPr>
+        <p:cNvPr id="1" name=""/>
+        <p:cNvGrpSpPr/>
+        <p:nvPr/>
+      </p:nvGrpSpPr>
+      <p:grpSpPr>
+        <a:xfrm>
+          <a:off x="0" y="0"/>
+          <a:ext cx="0" cy="0"/>
+          <a:chOff x="0" y="0"/>
+          <a:chExt cx="0" cy="0"/>
+        </a:xfrm>
+      </p:grpSpPr>
+      <p:sp>
+        <p:nvSpPr>
+          <p:cNvPr id="2" name="Header Placeholder 1"/>
+          <p:cNvSpPr>
+            <a:spLocks noGrp="1"/>
+          </p:cNvSpPr>
+          <p:nvPr>
+            <p:ph type="hdr" sz="quarter"/>
+          </p:nvPr>
+        </p:nvSpPr>
+        <p:spPr>
+          <a:xfrm>
+            <a:off x="0" y="0"/>
+            <a:ext cx="2971800" cy="458788"/>
+          </a:xfrm>
+          <a:prstGeom prst="rect">
+            <a:avLst/>
+          </a:prstGeom>
+        </p:spPr>
+        <p:txBody>
+          <a:bodyPr vert="horz" lIns="91440" tIns="45720" rIns="91440" bIns="45720" rtlCol="0"/>
+          <a:lstStyle>
+            <a:lvl1pPr algn="l">
+              <a:defRPr sz="1200"/>
+            </a:lvl1pPr>
+          </a:lstStyle>
+          <a:p>
+            <a:endParaRPr lang="en-GB"/>
+          </a:p>
+        </p:txBody>
+      </p:sp>
+      <p:sp>
+        <p:nvSpPr>
+          <p:cNvPr id="3" name="Date Placeholder 2"/>
+          <p:cNvSpPr>
+            <a:spLocks noGrp="1"/>
+          </p:cNvSpPr>
+          <p:nvPr>
+            <p:ph type="dt" idx="1"/>
+          </p:nvPr>
+        </p:nvSpPr>
+        <p:spPr>
+          <a:xfrm>
+            <a:off x="3884613" y="0"/>
+            <a:ext cx="2971800" cy="458788"/>
+          </a:xfrm>
+          <a:prstGeom prst="rect">
+            <a:avLst/>
+          </a:prstGeom>
+        </p:spPr>
+        <p:txBody>
+          <a:bodyPr vert="horz" lIns="91440" tIns="45720" rIns="91440" bIns="45720" rtlCol="0"/>
+          <a:lstStyle>
+            <a:lvl1pPr algn="r">
+              <a:defRPr sz="1200"/>
+            </a:lvl1pPr>
+          </a:lstStyle>
+          <a:p>
+            <a:fld id="{785C2E85-E0C9-9B45-9CB2-5AAE43139C52}" type="datetimeFigureOut">
+              <a:rPr lang="en-GB" smtClean="0"/>
+              <a:t>13/08/2018</a:t>
+            </a:fld>
+            <a:endParaRPr lang="en-GB"/>
+          </a:p>
+        </p:txBody>
+      </p:sp>
+      <p:sp>
+        <p:nvSpPr>
+          <p:cNvPr id="4" name="Slide Image Placeholder 3"/>
+          <p:cNvSpPr>
+            <a:spLocks noGrp="1" noRot="1" noChangeAspect="1"/>
+          </p:cNvSpPr>
+          <p:nvPr>
+            <p:ph type="sldImg" idx="2"/>
+          </p:nvPr>
+        </p:nvSpPr>
+        <p:spPr>
+          <a:xfrm>
+            <a:off x="685800" y="1143000"/>
+            <a:ext cx="5486400" cy="3086100"/>
+          </a:xfrm>
+          <a:prstGeom prst="rect">
+            <a:avLst/>
+          </a:prstGeom>
+          <a:noFill/>
+          <a:ln w="12700">
+            <a:solidFill>
+              <a:prstClr val="black"/>
+            </a:solidFill>
+          </a:ln>
+        </p:spPr>
+        <p:txBody>
+          <a:bodyPr vert="horz" lIns="91440" tIns="45720" rIns="91440" bIns="45720" rtlCol="0" anchor="ctr"/>
+          <a:lstStyle/>
+          <a:p>
+            <a:endParaRPr lang="en-GB"/>
+          </a:p>
+        </p:txBody>
+      </p:sp>
+      <p:sp>
+        <p:nvSpPr>
+          <p:cNvPr id="5" name="Notes Placeholder 4"/>
+          <p:cNvSpPr>
+            <a:spLocks noGrp="1"/>
+          </p:cNvSpPr>
+          <p:nvPr>
+            <p:ph type="body" sz="quarter" idx="3"/>
+          </p:nvPr>
+        </p:nvSpPr>
+        <p:spPr>
+          <a:xfrm>
+            <a:off x="685800" y="4400550"/>
+            <a:ext cx="5486400" cy="3600450"/>
+          </a:xfrm>
+          <a:prstGeom prst="rect">
+            <a:avLst/>
+          </a:prstGeom>
+        </p:spPr>
+        <p:txBody>
+          <a:bodyPr vert="horz" lIns="91440" tIns="45720" rIns="91440" bIns="45720" rtlCol="0"/>
+          <a:lstStyle/>
+          <a:p>
+            <a:pPr lvl="0"/>
+            <a:r>
+              <a:rPr lang="en-US"/>
+              <a:t>Edit Master text styles</a:t>
+            </a:r>
+          </a:p>
+          <a:p>
+            <a:pPr lvl="1"/>
+            <a:r>
+              <a:rPr lang="en-US"/>
+              <a:t>Second level</a:t>
+            </a:r>
+          </a:p>
+          <a:p>
+            <a:pPr lvl="2"/>
+            <a:r>
+              <a:rPr lang="en-US"/>
+              <a:t>Third level</a:t>
+            </a:r>
+          </a:p>
+          <a:p>
+            <a:pPr lvl="3"/>
+            <a:r>
+              <a:rPr lang="en-US"/>
+              <a:t>Fourth level</a:t>
+            </a:r>
+          </a:p>
+          <a:p>
+            <a:pPr lvl="4"/>
+            <a:r>
+              <a:rPr lang="en-US"/>
+              <a:t>Fifth level</a:t>
+            </a:r>
+            <a:endParaRPr lang="en-GB"/>
+          </a:p>
+        </p:txBody>
+      </p:sp>
+      <p:sp>
+        <p:nvSpPr>
+          <p:cNvPr id="6" name="Footer Placeholder 5"/>
+          <p:cNvSpPr>
+            <a:spLocks noGrp="1"/>
+          </p:cNvSpPr>
+          <p:nvPr>
+            <p:ph type="ftr" sz="quarter" idx="4"/>
+          </p:nvPr>
+        </p:nvSpPr>
+        <p:spPr>
+          <a:xfrm>
+            <a:off x="0" y="8685213"/>
+            <a:ext cx="2971800" cy="458787"/>
+          </a:xfrm>
+          <a:prstGeom prst="rect">
+            <a:avLst/>
+          </a:prstGeom>
+        </p:spPr>
+        <p:txBody>
+          <a:bodyPr vert="horz" lIns="91440" tIns="45720" rIns="91440" bIns="45720" rtlCol="0" anchor="b"/>
+          <a:lstStyle>
+            <a:lvl1pPr algn="l">
+              <a:defRPr sz="1200"/>
+            </a:lvl1pPr>
+          </a:lstStyle>
+          <a:p>
+            <a:endParaRPr lang="en-GB"/>
+          </a:p>
+        </p:txBody>
+      </p:sp>
+      <p:sp>
+        <p:nvSpPr>
+          <p:cNvPr id="7" name="Slide Number Placeholder 6"/>
+          <p:cNvSpPr>
+            <a:spLocks noGrp="1"/>
+          </p:cNvSpPr>
+          <p:nvPr>
+            <p:ph type="sldNum" sz="quarter" idx="5"/>
+          </p:nvPr>
+        </p:nvSpPr>
+        <p:spPr>
+          <a:xfrm>
+            <a:off x="3884613" y="8685213"/>
+            <a:ext cx="2971800" cy="458787"/>
+          </a:xfrm>
+          <a:prstGeom prst="rect">
+            <a:avLst/>
+          </a:prstGeom>
+        </p:spPr>
+        <p:txBody>
+          <a:bodyPr vert="horz" lIns="91440" tIns="45720" rIns="91440" bIns="45720" rtlCol="0" anchor="b"/>
+          <a:lstStyle>
+            <a:lvl1pPr algn="r">
+              <a:defRPr sz="1200"/>
+            </a:lvl1pPr>
+          </a:lstStyle>
+          <a:p>
+            <a:fld id="{B1E1D276-AA94-2941-AD60-9B19126A9453}" type="slidenum">
+              <a:rPr lang="en-GB" smtClean="0"/>
+              <a:t>‹#›</a:t>
+            </a:fld>
+            <a:endParaRPr lang="en-GB"/>
+          </a:p>
+        </p:txBody>
+      </p:sp>
+    </p:spTree>
+    <p:extLst>
+      <p:ext uri="{BB962C8B-B14F-4D97-AF65-F5344CB8AC3E}">
+        <p14:creationId xmlns:p14="http://schemas.microsoft.com/office/powerpoint/2010/main" val="2088736673"/>
+      </p:ext>
+    </p:extLst>
+  </p:cSld>
+  <p:clrMap bg1="lt1" tx1="dk1" bg2="lt2" tx2="dk2" accent1="accent1" accent2="accent2" accent3="accent3" accent4="accent4" accent5="accent5" accent6="accent6" hlink="hlink" folHlink="folHlink"/>
+  <p:notesStyle>
+    <a:lvl1pPr marL="0" algn="l" defTabSz="914400" rtl="0" eaLnBrk="1" latinLnBrk="0" hangingPunct="1">
+      <a:defRPr sz="1200" kern="1200">
+        <a:solidFill>
+          <a:schemeClr val="tx1"/>
+        </a:solidFill>
+        <a:latin typeface="+mn-lt"/>
+        <a:ea typeface="+mn-ea"/>
+        <a:cs typeface="+mn-cs"/>
+      </a:defRPr>
+    </a:lvl1pPr>
+    <a:lvl2pPr marL="457200" algn="l" defTabSz="914400" rtl="0" eaLnBrk="1" latinLnBrk="0" hangingPunct="1">
+      <a:defRPr sz="1200" kern="1200">
+        <a:solidFill>
+          <a:schemeClr val="tx1"/>
+        </a:solidFill>
+        <a:latin typeface="+mn-lt"/>
+        <a:ea typeface="+mn-ea"/>
+        <a:cs typeface="+mn-cs"/>
+      </a:defRPr>
+    </a:lvl2pPr>
+    <a:lvl3pPr marL="914400" algn="l" defTabSz="914400" rtl="0" eaLnBrk="1" latinLnBrk="0" hangingPunct="1">
+      <a:defRPr sz="1200" kern="1200">
+        <a:solidFill>
+          <a:schemeClr val="tx1"/>
+        </a:solidFill>
+        <a:latin typeface="+mn-lt"/>
+        <a:ea typeface="+mn-ea"/>
+        <a:cs typeface="+mn-cs"/>
+      </a:defRPr>
+    </a:lvl3pPr>
+    <a:lvl4pPr marL="1371600" algn="l" defTabSz="914400" rtl="0" eaLnBrk="1" latinLnBrk="0" hangingPunct="1">
+      <a:defRPr sz="1200" kern="1200">
+        <a:solidFill>
+          <a:schemeClr val="tx1"/>
+        </a:solidFill>
+        <a:latin typeface="+mn-lt"/>
+        <a:ea typeface="+mn-ea"/>
+        <a:cs typeface="+mn-cs"/>
+      </a:defRPr>
+    </a:lvl4pPr>
+    <a:lvl5pPr marL="1828800" algn="l" defTabSz="914400" rtl="0" eaLnBrk="1" latinLnBrk="0" hangingPunct="1">
+      <a:defRPr sz="1200" kern="1200">
+        <a:solidFill>
+          <a:schemeClr val="tx1"/>
+        </a:solidFill>
+        <a:latin typeface="+mn-lt"/>
+        <a:ea typeface="+mn-ea"/>
+        <a:cs typeface="+mn-cs"/>
+      </a:defRPr>
+    </a:lvl5pPr>
+    <a:lvl6pPr marL="2286000" algn="l" defTabSz="914400" rtl="0" eaLnBrk="1" latinLnBrk="0" hangingPunct="1">
+      <a:defRPr sz="1200" kern="1200">
+        <a:solidFill>
+          <a:schemeClr val="tx1"/>
+        </a:solidFill>
+        <a:latin typeface="+mn-lt"/>
+        <a:ea typeface="+mn-ea"/>
+        <a:cs typeface="+mn-cs"/>
+      </a:defRPr>
+    </a:lvl6pPr>
+    <a:lvl7pPr marL="2743200" algn="l" defTabSz="914400" rtl="0" eaLnBrk="1" latinLnBrk="0" hangingPunct="1">
+      <a:defRPr sz="1200" kern="1200">
+        <a:solidFill>
+          <a:schemeClr val="tx1"/>
+        </a:solidFill>
+        <a:latin typeface="+mn-lt"/>
+        <a:ea typeface="+mn-ea"/>
+        <a:cs typeface="+mn-cs"/>
+      </a:defRPr>
+    </a:lvl7pPr>
+    <a:lvl8pPr marL="3200400" algn="l" defTabSz="914400" rtl="0" eaLnBrk="1" latinLnBrk="0" hangingPunct="1">
+      <a:defRPr sz="1200" kern="1200">
+        <a:solidFill>
+          <a:schemeClr val="tx1"/>
+        </a:solidFill>
+        <a:latin typeface="+mn-lt"/>
+        <a:ea typeface="+mn-ea"/>
+        <a:cs typeface="+mn-cs"/>
+      </a:defRPr>
+    </a:lvl8pPr>
+    <a:lvl9pPr marL="3657600" algn="l" defTabSz="914400" rtl="0" eaLnBrk="1" latinLnBrk="0" hangingPunct="1">
+      <a:defRPr sz="1200" kern="1200">
+        <a:solidFill>
+          <a:schemeClr val="tx1"/>
+        </a:solidFill>
+        <a:latin typeface="+mn-lt"/>
+        <a:ea typeface="+mn-ea"/>
+        <a:cs typeface="+mn-cs"/>
+      </a:defRPr>
+    </a:lvl9pPr>
+  </p:notesStyle>
+</p:notesMaster>
+</file>
+
+<file path=ppt/notesSlides/notesSlide1.xml><?xml version="1.0" encoding="utf-8"?>
+<p:notes xmlns:a="http://schemas.openxmlformats.org/drawingml/2006/main" xmlns:r="http://schemas.openxmlformats.org/officeDocument/2006/relationships" xmlns:p="http://schemas.openxmlformats.org/presentationml/2006/main">
+  <p:cSld>
+    <p:spTree>
+      <p:nvGrpSpPr>
+        <p:cNvPr id="1" name=""/>
+        <p:cNvGrpSpPr/>
+        <p:nvPr/>
+      </p:nvGrpSpPr>
+      <p:grpSpPr>
+        <a:xfrm>
+          <a:off x="0" y="0"/>
+          <a:ext cx="0" cy="0"/>
+          <a:chOff x="0" y="0"/>
+          <a:chExt cx="0" cy="0"/>
+        </a:xfrm>
+      </p:grpSpPr>
+      <p:sp>
+        <p:nvSpPr>
+          <p:cNvPr id="2" name="Slide Image Placeholder 1"/>
+          <p:cNvSpPr>
+            <a:spLocks noGrp="1" noRot="1" noChangeAspect="1"/>
+          </p:cNvSpPr>
+          <p:nvPr>
+            <p:ph type="sldImg"/>
+          </p:nvPr>
+        </p:nvSpPr>
+        <p:spPr/>
+      </p:sp>
+      <p:sp>
+        <p:nvSpPr>
+          <p:cNvPr id="3" name="Notes Placeholder 2"/>
+          <p:cNvSpPr>
+            <a:spLocks noGrp="1"/>
+          </p:cNvSpPr>
+          <p:nvPr>
+            <p:ph type="body" idx="1"/>
+          </p:nvPr>
+        </p:nvSpPr>
+        <p:spPr/>
+        <p:txBody>
+          <a:bodyPr/>
+          <a:lstStyle/>
+          <a:p>
+            <a:endParaRPr lang="en-GB" dirty="0"/>
+          </a:p>
+        </p:txBody>
+      </p:sp>
+      <p:sp>
+        <p:nvSpPr>
+          <p:cNvPr id="4" name="Slide Number Placeholder 3"/>
+          <p:cNvSpPr>
+            <a:spLocks noGrp="1"/>
+          </p:cNvSpPr>
+          <p:nvPr>
+            <p:ph type="sldNum" sz="quarter" idx="10"/>
+          </p:nvPr>
+        </p:nvSpPr>
+        <p:spPr/>
+        <p:txBody>
+          <a:bodyPr/>
+          <a:lstStyle/>
+          <a:p>
+            <a:fld id="{B1E1D276-AA94-2941-AD60-9B19126A9453}" type="slidenum">
+              <a:rPr lang="en-GB" smtClean="0"/>
+              <a:t>2</a:t>
+            </a:fld>
+            <a:endParaRPr lang="en-GB"/>
+          </a:p>
+        </p:txBody>
+      </p:sp>
+    </p:spTree>
+    <p:extLst>
+      <p:ext uri="{BB962C8B-B14F-4D97-AF65-F5344CB8AC3E}">
+        <p14:creationId xmlns:p14="http://schemas.microsoft.com/office/powerpoint/2010/main" val="1090082386"/>
+      </p:ext>
+    </p:extLst>
+  </p:cSld>
+  <p:clrMapOvr>
+    <a:masterClrMapping/>
+  </p:clrMapOvr>
+</p:notes>
+</file>
+
 <file path=ppt/slideLayouts/slideLayout1.xml><?xml version="1.0" encoding="utf-8"?>
 <p:sldLayout xmlns:a="http://schemas.openxmlformats.org/drawingml/2006/main" xmlns:r="http://schemas.openxmlformats.org/officeDocument/2006/relationships" xmlns:p="http://schemas.openxmlformats.org/presentationml/2006/main" type="title" preserve="1">
   <p:cSld name="Title Slide">
@@ -263,7 +701,7 @@
           <a:p>
             <a:fld id="{C0CFEFE4-7B0A-4C4B-8E8A-64DA77ACFEEA}" type="datetimeFigureOut">
               <a:rPr lang="en-GB" smtClean="0"/>
-              <a:t>07/08/2018</a:t>
+              <a:t>13/08/2018</a:t>
             </a:fld>
             <a:endParaRPr lang="en-GB"/>
           </a:p>
@@ -463,7 +901,7 @@
           <a:p>
             <a:fld id="{C0CFEFE4-7B0A-4C4B-8E8A-64DA77ACFEEA}" type="datetimeFigureOut">
               <a:rPr lang="en-GB" smtClean="0"/>
-              <a:t>07/08/2018</a:t>
+              <a:t>13/08/2018</a:t>
             </a:fld>
             <a:endParaRPr lang="en-GB"/>
           </a:p>
@@ -673,7 +1111,7 @@
           <a:p>
             <a:fld id="{C0CFEFE4-7B0A-4C4B-8E8A-64DA77ACFEEA}" type="datetimeFigureOut">
               <a:rPr lang="en-GB" smtClean="0"/>
-              <a:t>07/08/2018</a:t>
+              <a:t>13/08/2018</a:t>
             </a:fld>
             <a:endParaRPr lang="en-GB"/>
           </a:p>
@@ -873,7 +1311,7 @@
           <a:p>
             <a:fld id="{C0CFEFE4-7B0A-4C4B-8E8A-64DA77ACFEEA}" type="datetimeFigureOut">
               <a:rPr lang="en-GB" smtClean="0"/>
-              <a:t>07/08/2018</a:t>
+              <a:t>13/08/2018</a:t>
             </a:fld>
             <a:endParaRPr lang="en-GB"/>
           </a:p>
@@ -1149,7 +1587,7 @@
           <a:p>
             <a:fld id="{C0CFEFE4-7B0A-4C4B-8E8A-64DA77ACFEEA}" type="datetimeFigureOut">
               <a:rPr lang="en-GB" smtClean="0"/>
-              <a:t>07/08/2018</a:t>
+              <a:t>13/08/2018</a:t>
             </a:fld>
             <a:endParaRPr lang="en-GB"/>
           </a:p>
@@ -1417,7 +1855,7 @@
           <a:p>
             <a:fld id="{C0CFEFE4-7B0A-4C4B-8E8A-64DA77ACFEEA}" type="datetimeFigureOut">
               <a:rPr lang="en-GB" smtClean="0"/>
-              <a:t>07/08/2018</a:t>
+              <a:t>13/08/2018</a:t>
             </a:fld>
             <a:endParaRPr lang="en-GB"/>
           </a:p>
@@ -1832,7 +2270,7 @@
           <a:p>
             <a:fld id="{C0CFEFE4-7B0A-4C4B-8E8A-64DA77ACFEEA}" type="datetimeFigureOut">
               <a:rPr lang="en-GB" smtClean="0"/>
-              <a:t>07/08/2018</a:t>
+              <a:t>13/08/2018</a:t>
             </a:fld>
             <a:endParaRPr lang="en-GB"/>
           </a:p>
@@ -1974,7 +2412,7 @@
           <a:p>
             <a:fld id="{C0CFEFE4-7B0A-4C4B-8E8A-64DA77ACFEEA}" type="datetimeFigureOut">
               <a:rPr lang="en-GB" smtClean="0"/>
-              <a:t>07/08/2018</a:t>
+              <a:t>13/08/2018</a:t>
             </a:fld>
             <a:endParaRPr lang="en-GB"/>
           </a:p>
@@ -2087,7 +2525,7 @@
           <a:p>
             <a:fld id="{C0CFEFE4-7B0A-4C4B-8E8A-64DA77ACFEEA}" type="datetimeFigureOut">
               <a:rPr lang="en-GB" smtClean="0"/>
-              <a:t>07/08/2018</a:t>
+              <a:t>13/08/2018</a:t>
             </a:fld>
             <a:endParaRPr lang="en-GB"/>
           </a:p>
@@ -2400,7 +2838,7 @@
           <a:p>
             <a:fld id="{C0CFEFE4-7B0A-4C4B-8E8A-64DA77ACFEEA}" type="datetimeFigureOut">
               <a:rPr lang="en-GB" smtClean="0"/>
-              <a:t>07/08/2018</a:t>
+              <a:t>13/08/2018</a:t>
             </a:fld>
             <a:endParaRPr lang="en-GB"/>
           </a:p>
@@ -2689,7 +3127,7 @@
           <a:p>
             <a:fld id="{C0CFEFE4-7B0A-4C4B-8E8A-64DA77ACFEEA}" type="datetimeFigureOut">
               <a:rPr lang="en-GB" smtClean="0"/>
-              <a:t>07/08/2018</a:t>
+              <a:t>13/08/2018</a:t>
             </a:fld>
             <a:endParaRPr lang="en-GB"/>
           </a:p>
@@ -2932,7 +3370,7 @@
           <a:p>
             <a:fld id="{C0CFEFE4-7B0A-4C4B-8E8A-64DA77ACFEEA}" type="datetimeFigureOut">
               <a:rPr lang="en-GB" smtClean="0"/>
-              <a:t>07/08/2018</a:t>
+              <a:t>13/08/2018</a:t>
             </a:fld>
             <a:endParaRPr lang="en-GB"/>
           </a:p>
@@ -3349,20 +3787,151 @@
           <a:chExt cx="0" cy="0"/>
         </a:xfrm>
       </p:grpSpPr>
-      <p:sp>
-        <p:nvSpPr>
-          <p:cNvPr id="2" name="Title 1">
-            <a:extLst>
-              <a:ext uri="{FF2B5EF4-FFF2-40B4-BE49-F238E27FC236}">
-                <a16:creationId xmlns:a16="http://schemas.microsoft.com/office/drawing/2014/main" id="{103C5528-B522-EE4C-B72B-E799755EB430}"/>
-              </a:ext>
-            </a:extLst>
-          </p:cNvPr>
-          <p:cNvSpPr>
-            <a:spLocks noGrp="1"/>
-          </p:cNvSpPr>
-          <p:nvPr>
-            <p:ph type="ctrTitle"/>
+      <mc:AlternateContent xmlns:mc="http://schemas.openxmlformats.org/markup-compatibility/2006">
+        <mc:Choice xmlns:a14="http://schemas.microsoft.com/office/drawing/2010/main" Requires="a14">
+          <p:sp>
+            <p:nvSpPr>
+              <p:cNvPr id="2" name="Title 1">
+                <a:extLst>
+                  <a:ext uri="{FF2B5EF4-FFF2-40B4-BE49-F238E27FC236}">
+                    <a16:creationId xmlns:a16="http://schemas.microsoft.com/office/drawing/2014/main" id="{103C5528-B522-EE4C-B72B-E799755EB430}"/>
+                  </a:ext>
+                </a:extLst>
+              </p:cNvPr>
+              <p:cNvSpPr>
+                <a:spLocks noGrp="1"/>
+              </p:cNvSpPr>
+              <p:nvPr>
+                <p:ph type="ctrTitle"/>
+              </p:nvPr>
+            </p:nvSpPr>
+            <p:spPr>
+              <a:xfrm>
+                <a:off x="0" y="1047412"/>
+                <a:ext cx="12192000" cy="2387600"/>
+              </a:xfrm>
+            </p:spPr>
+            <p:txBody>
+              <a:bodyPr>
+                <a:normAutofit fontScale="90000"/>
+              </a:bodyPr>
+              <a:lstStyle/>
+              <a:p>
+                <a:r>
+                  <a:rPr lang="en-GB" dirty="0">
+                    <a:latin typeface="Cambria" panose="02040503050406030204" pitchFamily="18" charset="0"/>
+                  </a:rPr>
+                  <a:t>Comparisons of the BNB and </a:t>
+                </a:r>
+                <a:r>
+                  <a:rPr lang="en-GB" dirty="0" err="1">
+                    <a:latin typeface="Cambria" panose="02040503050406030204" pitchFamily="18" charset="0"/>
+                  </a:rPr>
+                  <a:t>NuMI</a:t>
+                </a:r>
+                <a:r>
+                  <a:rPr lang="en-GB" dirty="0">
+                    <a:latin typeface="Cambria" panose="02040503050406030204" pitchFamily="18" charset="0"/>
+                  </a:rPr>
+                  <a:t> Kinematics of </a:t>
+                </a:r>
+                <a14:m>
+                  <m:oMath xmlns:m="http://schemas.openxmlformats.org/officeDocument/2006/math">
+                    <m:sSub>
+                      <m:sSubPr>
+                        <m:ctrlPr>
+                          <a:rPr lang="en-GB" b="0" i="1" smtClean="0">
+                            <a:latin typeface="Cambria Math" panose="02040503050406030204" pitchFamily="18" charset="0"/>
+                          </a:rPr>
+                        </m:ctrlPr>
+                      </m:sSubPr>
+                      <m:e>
+                        <m:r>
+                          <a:rPr lang="en-GB" b="0" i="1" smtClean="0">
+                            <a:latin typeface="Cambria Math" panose="02040503050406030204" pitchFamily="18" charset="0"/>
+                          </a:rPr>
+                          <m:t>𝜈</m:t>
+                        </m:r>
+                      </m:e>
+                      <m:sub>
+                        <m:r>
+                          <a:rPr lang="en-GB" b="0" i="1" smtClean="0">
+                            <a:latin typeface="Cambria Math" panose="02040503050406030204" pitchFamily="18" charset="0"/>
+                          </a:rPr>
+                          <m:t>𝑒</m:t>
+                        </m:r>
+                      </m:sub>
+                    </m:sSub>
+                  </m:oMath>
+                </a14:m>
+                <a:r>
+                  <a:rPr lang="en-GB" dirty="0">
+                    <a:latin typeface="Cambria" panose="02040503050406030204" pitchFamily="18" charset="0"/>
+                  </a:rPr>
+                  <a:t>’s and outgoing electrons</a:t>
+                </a:r>
+              </a:p>
+            </p:txBody>
+          </p:sp>
+        </mc:Choice>
+        <mc:Fallback>
+          <p:sp>
+            <p:nvSpPr>
+              <p:cNvPr id="2" name="Title 1">
+                <a:extLst>
+                  <a:ext uri="{FF2B5EF4-FFF2-40B4-BE49-F238E27FC236}">
+                    <a16:creationId xmlns:a16="http://schemas.microsoft.com/office/drawing/2014/main" id="{103C5528-B522-EE4C-B72B-E799755EB430}"/>
+                  </a:ext>
+                </a:extLst>
+              </p:cNvPr>
+              <p:cNvSpPr>
+                <a:spLocks noGrp="1" noRot="1" noChangeAspect="1" noMove="1" noResize="1" noEditPoints="1" noAdjustHandles="1" noChangeArrowheads="1" noChangeShapeType="1" noTextEdit="1"/>
+              </p:cNvSpPr>
+              <p:nvPr>
+                <p:ph type="ctrTitle"/>
+              </p:nvPr>
+            </p:nvSpPr>
+            <p:spPr>
+              <a:xfrm>
+                <a:off x="0" y="1047412"/>
+                <a:ext cx="12192000" cy="2387600"/>
+              </a:xfrm>
+              <a:blipFill>
+                <a:blip r:embed="rId2"/>
+                <a:stretch>
+                  <a:fillRect t="-6878" b="-15344"/>
+                </a:stretch>
+              </a:blipFill>
+            </p:spPr>
+            <p:txBody>
+              <a:bodyPr/>
+              <a:lstStyle/>
+              <a:p>
+                <a:r>
+                  <a:rPr lang="en-GB">
+                    <a:noFill/>
+                  </a:rPr>
+                  <a:t> </a:t>
+                </a:r>
+              </a:p>
+            </p:txBody>
+          </p:sp>
+        </mc:Fallback>
+      </mc:AlternateContent>
+      <p:sp>
+        <p:nvSpPr>
+          <p:cNvPr id="3" name="Subtitle 2">
+            <a:extLst>
+              <a:ext uri="{FF2B5EF4-FFF2-40B4-BE49-F238E27FC236}">
+                <a16:creationId xmlns:a16="http://schemas.microsoft.com/office/drawing/2014/main" id="{A5DCD148-7374-DF4C-8372-2732DDB78683}"/>
+              </a:ext>
+            </a:extLst>
+          </p:cNvPr>
+          <p:cNvSpPr>
+            <a:spLocks noGrp="1"/>
+          </p:cNvSpPr>
+          <p:nvPr>
+            <p:ph type="subTitle" idx="1"/>
           </p:nvPr>
         </p:nvSpPr>
         <p:spPr/>
@@ -3371,42 +3940,31 @@
           <a:lstStyle/>
           <a:p>
             <a:r>
-              <a:rPr lang="en-GB" dirty="0"/>
-              <a:t>Updated Plots for BNB with </a:t>
-            </a:r>
-            <a:r>
-              <a:rPr lang="en-GB" dirty="0" err="1"/>
-              <a:t>NuMI</a:t>
-            </a:r>
-            <a:r>
-              <a:rPr lang="en-GB" dirty="0"/>
-              <a:t> Phase Space</a:t>
-            </a:r>
-          </a:p>
-        </p:txBody>
-      </p:sp>
-      <p:sp>
-        <p:nvSpPr>
-          <p:cNvPr id="3" name="Subtitle 2">
-            <a:extLst>
-              <a:ext uri="{FF2B5EF4-FFF2-40B4-BE49-F238E27FC236}">
-                <a16:creationId xmlns:a16="http://schemas.microsoft.com/office/drawing/2014/main" id="{A5DCD148-7374-DF4C-8372-2732DDB78683}"/>
-              </a:ext>
-            </a:extLst>
-          </p:cNvPr>
-          <p:cNvSpPr>
-            <a:spLocks noGrp="1"/>
-          </p:cNvSpPr>
-          <p:nvPr>
-            <p:ph type="subTitle" idx="1"/>
-          </p:nvPr>
-        </p:nvSpPr>
-        <p:spPr/>
-        <p:txBody>
-          <a:bodyPr/>
-          <a:lstStyle/>
-          <a:p>
-            <a:endParaRPr lang="en-GB" dirty="0"/>
+              <a:rPr lang="en-GB" dirty="0">
+                <a:latin typeface="Cambria" panose="02040503050406030204" pitchFamily="18" charset="0"/>
+              </a:rPr>
+              <a:t>Krishan Mistry </a:t>
+            </a:r>
+          </a:p>
+          <a:p>
+            <a:r>
+              <a:rPr lang="en-GB" dirty="0">
+                <a:latin typeface="Cambria" panose="02040503050406030204" pitchFamily="18" charset="0"/>
+              </a:rPr>
+              <a:t>13</a:t>
+            </a:r>
+            <a:r>
+              <a:rPr lang="en-GB" baseline="30000" dirty="0">
+                <a:latin typeface="Cambria" panose="02040503050406030204" pitchFamily="18" charset="0"/>
+              </a:rPr>
+              <a:t>th</a:t>
+            </a:r>
+            <a:r>
+              <a:rPr lang="en-GB" dirty="0">
+                <a:latin typeface="Cambria" panose="02040503050406030204" pitchFamily="18" charset="0"/>
+              </a:rPr>
+              <a:t> August 2018</a:t>
+            </a:r>
           </a:p>
         </p:txBody>
       </p:sp>
@@ -3440,42 +3998,121 @@
           <a:chExt cx="0" cy="0"/>
         </a:xfrm>
       </p:grpSpPr>
-      <p:sp>
-        <p:nvSpPr>
-          <p:cNvPr id="2" name="Title 1">
-            <a:extLst>
-              <a:ext uri="{FF2B5EF4-FFF2-40B4-BE49-F238E27FC236}">
-                <a16:creationId xmlns:a16="http://schemas.microsoft.com/office/drawing/2014/main" id="{00B2FBE0-B09A-4B47-BCDF-9525A7F650CA}"/>
-              </a:ext>
-            </a:extLst>
-          </p:cNvPr>
-          <p:cNvSpPr>
-            <a:spLocks noGrp="1"/>
-          </p:cNvSpPr>
-          <p:nvPr>
-            <p:ph type="title"/>
-          </p:nvPr>
-        </p:nvSpPr>
-        <p:spPr/>
-        <p:txBody>
-          <a:bodyPr/>
-          <a:lstStyle/>
-          <a:p>
-            <a:r>
-              <a:rPr lang="en-GB" dirty="0"/>
-              <a:t>Incoming </a:t>
-            </a:r>
-            <a:r>
-              <a:rPr lang="en-GB" dirty="0" err="1"/>
-              <a:t>Nue</a:t>
-            </a:r>
-            <a:r>
-              <a:rPr lang="en-GB" dirty="0"/>
-              <a:t> Kinematics</a:t>
-            </a:r>
-          </a:p>
-        </p:txBody>
-      </p:sp>
+      <mc:AlternateContent xmlns:mc="http://schemas.openxmlformats.org/markup-compatibility/2006">
+        <mc:Choice xmlns:a14="http://schemas.microsoft.com/office/drawing/2010/main" Requires="a14">
+          <p:sp>
+            <p:nvSpPr>
+              <p:cNvPr id="2" name="Title 1">
+                <a:extLst>
+                  <a:ext uri="{FF2B5EF4-FFF2-40B4-BE49-F238E27FC236}">
+                    <a16:creationId xmlns:a16="http://schemas.microsoft.com/office/drawing/2014/main" id="{00B2FBE0-B09A-4B47-BCDF-9525A7F650CA}"/>
+                  </a:ext>
+                </a:extLst>
+              </p:cNvPr>
+              <p:cNvSpPr>
+                <a:spLocks noGrp="1"/>
+              </p:cNvSpPr>
+              <p:nvPr>
+                <p:ph type="title"/>
+              </p:nvPr>
+            </p:nvSpPr>
+            <p:spPr>
+              <a:xfrm>
+                <a:off x="1027367" y="714633"/>
+                <a:ext cx="10515600" cy="1325563"/>
+              </a:xfrm>
+            </p:spPr>
+            <p:txBody>
+              <a:bodyPr/>
+              <a:lstStyle/>
+              <a:p>
+                <a:pPr algn="ctr"/>
+                <a:r>
+                  <a:rPr lang="en-GB" dirty="0">
+                    <a:latin typeface="Cambria" panose="02040503050406030204" pitchFamily="18" charset="0"/>
+                  </a:rPr>
+                  <a:t>Incoming </a:t>
+                </a:r>
+                <a14:m>
+                  <m:oMath xmlns:m="http://schemas.openxmlformats.org/officeDocument/2006/math">
+                    <m:sSub>
+                      <m:sSubPr>
+                        <m:ctrlPr>
+                          <a:rPr lang="en-GB" i="1">
+                            <a:latin typeface="Cambria Math" panose="02040503050406030204" pitchFamily="18" charset="0"/>
+                          </a:rPr>
+                        </m:ctrlPr>
+                      </m:sSubPr>
+                      <m:e>
+                        <m:r>
+                          <a:rPr lang="en-GB" i="1">
+                            <a:latin typeface="Cambria Math" panose="02040503050406030204" pitchFamily="18" charset="0"/>
+                          </a:rPr>
+                          <m:t>𝜈</m:t>
+                        </m:r>
+                      </m:e>
+                      <m:sub>
+                        <m:r>
+                          <a:rPr lang="en-GB" i="1">
+                            <a:latin typeface="Cambria Math" panose="02040503050406030204" pitchFamily="18" charset="0"/>
+                          </a:rPr>
+                          <m:t>𝑒</m:t>
+                        </m:r>
+                      </m:sub>
+                    </m:sSub>
+                  </m:oMath>
+                </a14:m>
+                <a:endParaRPr lang="en-GB" dirty="0">
+                  <a:latin typeface="Cambria" panose="02040503050406030204" pitchFamily="18" charset="0"/>
+                </a:endParaRPr>
+              </a:p>
+            </p:txBody>
+          </p:sp>
+        </mc:Choice>
+        <mc:Fallback>
+          <p:sp>
+            <p:nvSpPr>
+              <p:cNvPr id="2" name="Title 1">
+                <a:extLst>
+                  <a:ext uri="{FF2B5EF4-FFF2-40B4-BE49-F238E27FC236}">
+                    <a16:creationId xmlns:a16="http://schemas.microsoft.com/office/drawing/2014/main" id="{00B2FBE0-B09A-4B47-BCDF-9525A7F650CA}"/>
+                  </a:ext>
+                </a:extLst>
+              </p:cNvPr>
+              <p:cNvSpPr>
+                <a:spLocks noGrp="1" noRot="1" noChangeAspect="1" noMove="1" noResize="1" noEditPoints="1" noAdjustHandles="1" noChangeArrowheads="1" noChangeShapeType="1" noTextEdit="1"/>
+              </p:cNvSpPr>
+              <p:nvPr>
+                <p:ph type="title"/>
+              </p:nvPr>
+            </p:nvSpPr>
+            <p:spPr>
+              <a:xfrm>
+                <a:off x="1027367" y="714633"/>
+                <a:ext cx="10515600" cy="1325563"/>
+              </a:xfrm>
+              <a:blipFill>
+                <a:blip r:embed="rId3"/>
+                <a:stretch>
+                  <a:fillRect/>
+                </a:stretch>
+              </a:blipFill>
+            </p:spPr>
+            <p:txBody>
+              <a:bodyPr/>
+              <a:lstStyle/>
+              <a:p>
+                <a:r>
+                  <a:rPr lang="en-GB">
+                    <a:noFill/>
+                  </a:rPr>
+                  <a:t> </a:t>
+                </a:r>
+              </a:p>
+            </p:txBody>
+          </p:sp>
+        </mc:Fallback>
+      </mc:AlternateContent>
       <p:pic>
         <p:nvPicPr>
           <p:cNvPr id="5" name="Picture 4">
@@ -3491,15 +4128,15 @@
           <p:nvPr/>
         </p:nvPicPr>
         <p:blipFill>
-          <a:blip r:embed="rId2"/>
+          <a:blip r:embed="rId4"/>
           <a:stretch>
             <a:fillRect/>
           </a:stretch>
         </p:blipFill>
         <p:spPr>
           <a:xfrm>
-            <a:off x="0" y="2070250"/>
-            <a:ext cx="6300836" cy="4278791"/>
+            <a:off x="0" y="2146074"/>
+            <a:ext cx="6285167" cy="4278791"/>
           </a:xfrm>
           <a:prstGeom prst="rect">
             <a:avLst/>
@@ -3521,15 +4158,15 @@
           <p:nvPr/>
         </p:nvPicPr>
         <p:blipFill>
-          <a:blip r:embed="rId3"/>
+          <a:blip r:embed="rId5"/>
           <a:stretch>
             <a:fillRect/>
           </a:stretch>
         </p:blipFill>
         <p:spPr>
           <a:xfrm>
-            <a:off x="6522389" y="2354966"/>
-            <a:ext cx="5462303" cy="3709357"/>
+            <a:off x="6410776" y="2146074"/>
+            <a:ext cx="5781224" cy="4278790"/>
           </a:xfrm>
           <a:prstGeom prst="rect">
             <a:avLst/>
@@ -3566,78 +4203,130 @@
           <a:chExt cx="0" cy="0"/>
         </a:xfrm>
       </p:grpSpPr>
-      <p:sp>
-        <p:nvSpPr>
-          <p:cNvPr id="2" name="Title 1">
-            <a:extLst>
-              <a:ext uri="{FF2B5EF4-FFF2-40B4-BE49-F238E27FC236}">
-                <a16:creationId xmlns:a16="http://schemas.microsoft.com/office/drawing/2014/main" id="{11FC71C7-2D61-474D-835F-E4D0C5356A34}"/>
-              </a:ext>
-            </a:extLst>
-          </p:cNvPr>
-          <p:cNvSpPr>
-            <a:spLocks noGrp="1"/>
-          </p:cNvSpPr>
-          <p:nvPr>
-            <p:ph type="title"/>
-          </p:nvPr>
-        </p:nvSpPr>
-        <p:spPr/>
-        <p:txBody>
-          <a:bodyPr/>
-          <a:lstStyle/>
-          <a:p>
-            <a:r>
-              <a:rPr lang="en-GB" dirty="0"/>
-              <a:t>Outgoing Electron from </a:t>
-            </a:r>
-            <a:r>
-              <a:rPr lang="en-GB" dirty="0" err="1"/>
-              <a:t>Nue</a:t>
-            </a:r>
-            <a:r>
-              <a:rPr lang="en-GB" dirty="0"/>
-              <a:t> Interaction Kinematics</a:t>
-            </a:r>
-          </a:p>
-        </p:txBody>
-      </p:sp>
+      <mc:AlternateContent xmlns:mc="http://schemas.openxmlformats.org/markup-compatibility/2006">
+        <mc:Choice xmlns:a14="http://schemas.microsoft.com/office/drawing/2010/main" Requires="a14">
+          <p:sp>
+            <p:nvSpPr>
+              <p:cNvPr id="2" name="Title 1">
+                <a:extLst>
+                  <a:ext uri="{FF2B5EF4-FFF2-40B4-BE49-F238E27FC236}">
+                    <a16:creationId xmlns:a16="http://schemas.microsoft.com/office/drawing/2014/main" id="{11FC71C7-2D61-474D-835F-E4D0C5356A34}"/>
+                  </a:ext>
+                </a:extLst>
+              </p:cNvPr>
+              <p:cNvSpPr>
+                <a:spLocks noGrp="1"/>
+              </p:cNvSpPr>
+              <p:nvPr>
+                <p:ph type="title"/>
+              </p:nvPr>
+            </p:nvSpPr>
+            <p:spPr>
+              <a:xfrm>
+                <a:off x="7598" y="634948"/>
+                <a:ext cx="12184402" cy="1325563"/>
+              </a:xfrm>
+            </p:spPr>
+            <p:txBody>
+              <a:bodyPr/>
+              <a:lstStyle/>
+              <a:p>
+                <a:pPr algn="ctr"/>
+                <a:r>
+                  <a:rPr lang="en-GB" dirty="0">
+                    <a:latin typeface="Cambria" panose="02040503050406030204" pitchFamily="18" charset="0"/>
+                  </a:rPr>
+                  <a:t>Outgoing Electron from </a:t>
+                </a:r>
+                <a14:m>
+                  <m:oMath xmlns:m="http://schemas.openxmlformats.org/officeDocument/2006/math">
+                    <m:sSub>
+                      <m:sSubPr>
+                        <m:ctrlPr>
+                          <a:rPr lang="en-GB" i="1">
+                            <a:latin typeface="Cambria Math" panose="02040503050406030204" pitchFamily="18" charset="0"/>
+                          </a:rPr>
+                        </m:ctrlPr>
+                      </m:sSubPr>
+                      <m:e>
+                        <m:r>
+                          <a:rPr lang="en-GB" i="1">
+                            <a:latin typeface="Cambria Math" panose="02040503050406030204" pitchFamily="18" charset="0"/>
+                          </a:rPr>
+                          <m:t>𝜈</m:t>
+                        </m:r>
+                      </m:e>
+                      <m:sub>
+                        <m:r>
+                          <a:rPr lang="en-GB" i="1">
+                            <a:latin typeface="Cambria Math" panose="02040503050406030204" pitchFamily="18" charset="0"/>
+                          </a:rPr>
+                          <m:t>𝑒</m:t>
+                        </m:r>
+                      </m:sub>
+                    </m:sSub>
+                  </m:oMath>
+                </a14:m>
+                <a:r>
+                  <a:rPr lang="en-GB" dirty="0">
+                    <a:latin typeface="Cambria" panose="02040503050406030204" pitchFamily="18" charset="0"/>
+                  </a:rPr>
+                  <a:t> Interaction</a:t>
+                </a:r>
+              </a:p>
+            </p:txBody>
+          </p:sp>
+        </mc:Choice>
+        <mc:Fallback>
+          <p:sp>
+            <p:nvSpPr>
+              <p:cNvPr id="2" name="Title 1">
+                <a:extLst>
+                  <a:ext uri="{FF2B5EF4-FFF2-40B4-BE49-F238E27FC236}">
+                    <a16:creationId xmlns:a16="http://schemas.microsoft.com/office/drawing/2014/main" id="{11FC71C7-2D61-474D-835F-E4D0C5356A34}"/>
+                  </a:ext>
+                </a:extLst>
+              </p:cNvPr>
+              <p:cNvSpPr>
+                <a:spLocks noGrp="1" noRot="1" noChangeAspect="1" noMove="1" noResize="1" noEditPoints="1" noAdjustHandles="1" noChangeArrowheads="1" noChangeShapeType="1" noTextEdit="1"/>
+              </p:cNvSpPr>
+              <p:nvPr>
+                <p:ph type="title"/>
+              </p:nvPr>
+            </p:nvSpPr>
+            <p:spPr>
+              <a:xfrm>
+                <a:off x="7598" y="634948"/>
+                <a:ext cx="12184402" cy="1325563"/>
+              </a:xfrm>
+              <a:blipFill>
+                <a:blip r:embed="rId2"/>
+                <a:stretch>
+                  <a:fillRect/>
+                </a:stretch>
+              </a:blipFill>
+            </p:spPr>
+            <p:txBody>
+              <a:bodyPr/>
+              <a:lstStyle/>
+              <a:p>
+                <a:r>
+                  <a:rPr lang="en-GB">
+                    <a:noFill/>
+                  </a:rPr>
+                  <a:t> </a:t>
+                </a:r>
+              </a:p>
+            </p:txBody>
+          </p:sp>
+        </mc:Fallback>
+      </mc:AlternateContent>
       <p:pic>
         <p:nvPicPr>
           <p:cNvPr id="7" name="Picture 6">
             <a:extLst>
               <a:ext uri="{FF2B5EF4-FFF2-40B4-BE49-F238E27FC236}">
                 <a16:creationId xmlns:a16="http://schemas.microsoft.com/office/drawing/2014/main" id="{5BD411E7-3735-294A-BD03-5096A070DB3B}"/>
-              </a:ext>
-            </a:extLst>
-          </p:cNvPr>
-          <p:cNvPicPr>
-            <a:picLocks noChangeAspect="1"/>
-          </p:cNvPicPr>
-          <p:nvPr/>
-        </p:nvPicPr>
-        <p:blipFill>
-          <a:blip r:embed="rId2"/>
-          <a:stretch>
-            <a:fillRect/>
-          </a:stretch>
-        </p:blipFill>
-        <p:spPr>
-          <a:xfrm>
-            <a:off x="0" y="2342934"/>
-            <a:ext cx="6110159" cy="4149305"/>
-          </a:xfrm>
-          <a:prstGeom prst="rect">
-            <a:avLst/>
-          </a:prstGeom>
-        </p:spPr>
-      </p:pic>
-      <p:pic>
-        <p:nvPicPr>
-          <p:cNvPr id="4" name="Picture 3">
-            <a:extLst>
-              <a:ext uri="{FF2B5EF4-FFF2-40B4-BE49-F238E27FC236}">
-                <a16:creationId xmlns:a16="http://schemas.microsoft.com/office/drawing/2014/main" id="{61DA6F54-1DE0-7448-83F6-ACA9E22237E2}"/>
               </a:ext>
             </a:extLst>
           </p:cNvPr>
@@ -3654,8 +4343,38 @@
         </p:blipFill>
         <p:spPr>
           <a:xfrm>
-            <a:off x="6110159" y="2536858"/>
-            <a:ext cx="5824591" cy="3955381"/>
+            <a:off x="103851" y="2333309"/>
+            <a:ext cx="6094963" cy="4149305"/>
+          </a:xfrm>
+          <a:prstGeom prst="rect">
+            <a:avLst/>
+          </a:prstGeom>
+        </p:spPr>
+      </p:pic>
+      <p:pic>
+        <p:nvPicPr>
+          <p:cNvPr id="4" name="Picture 3">
+            <a:extLst>
+              <a:ext uri="{FF2B5EF4-FFF2-40B4-BE49-F238E27FC236}">
+                <a16:creationId xmlns:a16="http://schemas.microsoft.com/office/drawing/2014/main" id="{61DA6F54-1DE0-7448-83F6-ACA9E22237E2}"/>
+              </a:ext>
+            </a:extLst>
+          </p:cNvPr>
+          <p:cNvPicPr>
+            <a:picLocks noChangeAspect="1"/>
+          </p:cNvPicPr>
+          <p:nvPr/>
+        </p:nvPicPr>
+        <p:blipFill>
+          <a:blip r:embed="rId4"/>
+          <a:stretch>
+            <a:fillRect/>
+          </a:stretch>
+        </p:blipFill>
+        <p:spPr>
+          <a:xfrm>
+            <a:off x="6309906" y="2333309"/>
+            <a:ext cx="5810106" cy="4149305"/>
           </a:xfrm>
           <a:prstGeom prst="rect">
             <a:avLst/>
@@ -3666,6 +4385,320 @@
     <p:extLst>
       <p:ext uri="{BB962C8B-B14F-4D97-AF65-F5344CB8AC3E}">
         <p14:creationId xmlns:p14="http://schemas.microsoft.com/office/powerpoint/2010/main" val="2196154251"/>
+      </p:ext>
+    </p:extLst>
+  </p:cSld>
+  <p:clrMapOvr>
+    <a:masterClrMapping/>
+  </p:clrMapOvr>
+</p:sld>
+</file>
+
+<file path=ppt/slides/slide4.xml><?xml version="1.0" encoding="utf-8"?>
+<p:sld xmlns:a="http://schemas.openxmlformats.org/drawingml/2006/main" xmlns:r="http://schemas.openxmlformats.org/officeDocument/2006/relationships" xmlns:p="http://schemas.openxmlformats.org/presentationml/2006/main">
+  <p:cSld>
+    <p:spTree>
+      <p:nvGrpSpPr>
+        <p:cNvPr id="1" name=""/>
+        <p:cNvGrpSpPr/>
+        <p:nvPr/>
+      </p:nvGrpSpPr>
+      <p:grpSpPr>
+        <a:xfrm>
+          <a:off x="0" y="0"/>
+          <a:ext cx="0" cy="0"/>
+          <a:chOff x="0" y="0"/>
+          <a:chExt cx="0" cy="0"/>
+        </a:xfrm>
+      </p:grpSpPr>
+      <p:sp>
+        <p:nvSpPr>
+          <p:cNvPr id="2" name="Title 1">
+            <a:extLst>
+              <a:ext uri="{FF2B5EF4-FFF2-40B4-BE49-F238E27FC236}">
+                <a16:creationId xmlns:a16="http://schemas.microsoft.com/office/drawing/2014/main" id="{FF00A5D2-EE82-3948-83B3-1150E39F52A2}"/>
+              </a:ext>
+            </a:extLst>
+          </p:cNvPr>
+          <p:cNvSpPr>
+            <a:spLocks noGrp="1"/>
+          </p:cNvSpPr>
+          <p:nvPr>
+            <p:ph type="title"/>
+          </p:nvPr>
+        </p:nvSpPr>
+        <p:spPr>
+          <a:xfrm>
+            <a:off x="562131" y="0"/>
+            <a:ext cx="10515600" cy="1325563"/>
+          </a:xfrm>
+        </p:spPr>
+        <p:txBody>
+          <a:bodyPr/>
+          <a:lstStyle/>
+          <a:p>
+            <a:r>
+              <a:rPr lang="en-GB" dirty="0">
+                <a:latin typeface="Cambria" panose="02040503050406030204" pitchFamily="18" charset="0"/>
+              </a:rPr>
+              <a:t>Some details about the plots</a:t>
+            </a:r>
+          </a:p>
+        </p:txBody>
+      </p:sp>
+      <mc:AlternateContent xmlns:mc="http://schemas.openxmlformats.org/markup-compatibility/2006">
+        <mc:Choice xmlns:a14="http://schemas.microsoft.com/office/drawing/2010/main" Requires="a14">
+          <p:sp>
+            <p:nvSpPr>
+              <p:cNvPr id="3" name="Content Placeholder 2">
+                <a:extLst>
+                  <a:ext uri="{FF2B5EF4-FFF2-40B4-BE49-F238E27FC236}">
+                    <a16:creationId xmlns:a16="http://schemas.microsoft.com/office/drawing/2014/main" id="{21E4BAD3-9F37-C24F-85AB-B98D274A5BDC}"/>
+                  </a:ext>
+                </a:extLst>
+              </p:cNvPr>
+              <p:cNvSpPr>
+                <a:spLocks noGrp="1"/>
+              </p:cNvSpPr>
+              <p:nvPr>
+                <p:ph idx="1"/>
+              </p:nvPr>
+            </p:nvSpPr>
+            <p:spPr>
+              <a:xfrm>
+                <a:off x="562131" y="1255999"/>
+                <a:ext cx="10972800" cy="5602001"/>
+              </a:xfrm>
+            </p:spPr>
+            <p:txBody>
+              <a:bodyPr/>
+              <a:lstStyle/>
+              <a:p>
+                <a:r>
+                  <a:rPr lang="en-GB" dirty="0">
+                    <a:latin typeface="Cambria" panose="02040503050406030204" pitchFamily="18" charset="0"/>
+                  </a:rPr>
+                  <a:t>Comparing the kinematics of the </a:t>
+                </a:r>
+                <a14:m>
+                  <m:oMath xmlns:m="http://schemas.openxmlformats.org/officeDocument/2006/math">
+                    <m:sSub>
+                      <m:sSubPr>
+                        <m:ctrlPr>
+                          <a:rPr lang="en-GB" i="1">
+                            <a:latin typeface="Cambria Math" panose="02040503050406030204" pitchFamily="18" charset="0"/>
+                          </a:rPr>
+                        </m:ctrlPr>
+                      </m:sSubPr>
+                      <m:e>
+                        <m:r>
+                          <a:rPr lang="en-GB" i="1">
+                            <a:latin typeface="Cambria Math" panose="02040503050406030204" pitchFamily="18" charset="0"/>
+                          </a:rPr>
+                          <m:t>𝜈</m:t>
+                        </m:r>
+                      </m:e>
+                      <m:sub>
+                        <m:r>
+                          <a:rPr lang="en-GB" i="1">
+                            <a:latin typeface="Cambria Math" panose="02040503050406030204" pitchFamily="18" charset="0"/>
+                          </a:rPr>
+                          <m:t>𝑒</m:t>
+                        </m:r>
+                      </m:sub>
+                    </m:sSub>
+                  </m:oMath>
+                </a14:m>
+                <a:r>
+                  <a:rPr lang="en-GB" dirty="0">
+                    <a:latin typeface="Cambria" panose="02040503050406030204" pitchFamily="18" charset="0"/>
+                  </a:rPr>
+                  <a:t>’s  and outgoing electrons from the BNB and </a:t>
+                </a:r>
+                <a:r>
+                  <a:rPr lang="en-GB" dirty="0" err="1">
+                    <a:latin typeface="Cambria" panose="02040503050406030204" pitchFamily="18" charset="0"/>
+                  </a:rPr>
+                  <a:t>NuMI</a:t>
+                </a:r>
+                <a:r>
+                  <a:rPr lang="en-GB" dirty="0">
+                    <a:latin typeface="Cambria" panose="02040503050406030204" pitchFamily="18" charset="0"/>
+                  </a:rPr>
+                  <a:t> in Monte Carlo. </a:t>
+                </a:r>
+              </a:p>
+              <a:p>
+                <a:endParaRPr lang="en-GB" dirty="0">
+                  <a:latin typeface="Cambria" panose="02040503050406030204" pitchFamily="18" charset="0"/>
+                </a:endParaRPr>
+              </a:p>
+              <a:p>
+                <a:r>
+                  <a:rPr lang="en-GB" dirty="0">
+                    <a:latin typeface="Cambria" panose="02040503050406030204" pitchFamily="18" charset="0"/>
+                  </a:rPr>
+                  <a:t>BNB plots are produced using the MCC8.4 intrinsic </a:t>
+                </a:r>
+                <a14:m>
+                  <m:oMath xmlns:m="http://schemas.openxmlformats.org/officeDocument/2006/math">
+                    <m:sSub>
+                      <m:sSubPr>
+                        <m:ctrlPr>
+                          <a:rPr lang="en-GB" i="1">
+                            <a:latin typeface="Cambria Math" panose="02040503050406030204" pitchFamily="18" charset="0"/>
+                          </a:rPr>
+                        </m:ctrlPr>
+                      </m:sSubPr>
+                      <m:e>
+                        <m:r>
+                          <a:rPr lang="en-GB" i="1">
+                            <a:latin typeface="Cambria Math" panose="02040503050406030204" pitchFamily="18" charset="0"/>
+                          </a:rPr>
+                          <m:t>𝜈</m:t>
+                        </m:r>
+                      </m:e>
+                      <m:sub>
+                        <m:r>
+                          <a:rPr lang="en-GB" i="1">
+                            <a:latin typeface="Cambria Math" panose="02040503050406030204" pitchFamily="18" charset="0"/>
+                          </a:rPr>
+                          <m:t>𝑒</m:t>
+                        </m:r>
+                      </m:sub>
+                    </m:sSub>
+                  </m:oMath>
+                </a14:m>
+                <a:r>
+                  <a:rPr lang="en-GB" dirty="0">
+                    <a:latin typeface="Cambria" panose="02040503050406030204" pitchFamily="18" charset="0"/>
+                  </a:rPr>
+                  <a:t> sample, ~40k events.</a:t>
+                </a:r>
+              </a:p>
+              <a:p>
+                <a:endParaRPr lang="en-GB" dirty="0">
+                  <a:latin typeface="Cambria" panose="02040503050406030204" pitchFamily="18" charset="0"/>
+                </a:endParaRPr>
+              </a:p>
+              <a:p>
+                <a:r>
+                  <a:rPr lang="en-GB" dirty="0" err="1">
+                    <a:latin typeface="Cambria" panose="02040503050406030204" pitchFamily="18" charset="0"/>
+                  </a:rPr>
+                  <a:t>NuMI</a:t>
+                </a:r>
+                <a:r>
+                  <a:rPr lang="en-GB" dirty="0">
+                    <a:latin typeface="Cambria" panose="02040503050406030204" pitchFamily="18" charset="0"/>
+                  </a:rPr>
+                  <a:t> phase space are using the kinematics of the selected </a:t>
+                </a:r>
+                <a14:m>
+                  <m:oMath xmlns:m="http://schemas.openxmlformats.org/officeDocument/2006/math">
+                    <m:sSub>
+                      <m:sSubPr>
+                        <m:ctrlPr>
+                          <a:rPr lang="en-GB" i="1">
+                            <a:latin typeface="Cambria Math" panose="02040503050406030204" pitchFamily="18" charset="0"/>
+                          </a:rPr>
+                        </m:ctrlPr>
+                      </m:sSubPr>
+                      <m:e>
+                        <m:r>
+                          <a:rPr lang="en-GB" i="1">
+                            <a:latin typeface="Cambria Math" panose="02040503050406030204" pitchFamily="18" charset="0"/>
+                          </a:rPr>
+                          <m:t>𝜈</m:t>
+                        </m:r>
+                      </m:e>
+                      <m:sub>
+                        <m:r>
+                          <a:rPr lang="en-GB" i="1">
+                            <a:latin typeface="Cambria Math" panose="02040503050406030204" pitchFamily="18" charset="0"/>
+                          </a:rPr>
+                          <m:t>𝑒</m:t>
+                        </m:r>
+                      </m:sub>
+                    </m:sSub>
+                  </m:oMath>
+                </a14:m>
+                <a:r>
+                  <a:rPr lang="en-GB" dirty="0">
+                    <a:latin typeface="Cambria" panose="02040503050406030204" pitchFamily="18" charset="0"/>
+                  </a:rPr>
+                  <a:t> and electrons from a sample of Colton’s analysis ~ 4k events. </a:t>
+                </a:r>
+              </a:p>
+              <a:p>
+                <a:endParaRPr lang="en-GB" dirty="0">
+                  <a:latin typeface="Cambria" panose="02040503050406030204" pitchFamily="18" charset="0"/>
+                </a:endParaRPr>
+              </a:p>
+              <a:p>
+                <a:r>
+                  <a:rPr lang="en-GB" dirty="0">
+                    <a:latin typeface="Cambria" panose="02040503050406030204" pitchFamily="18" charset="0"/>
+                  </a:rPr>
+                  <a:t>The BNB events have been normalised to the number of selected events from Colton’s analysis. </a:t>
+                </a:r>
+              </a:p>
+              <a:p>
+                <a:endParaRPr lang="en-GB" dirty="0">
+                  <a:latin typeface="Cambria" panose="02040503050406030204" pitchFamily="18" charset="0"/>
+                </a:endParaRPr>
+              </a:p>
+            </p:txBody>
+          </p:sp>
+        </mc:Choice>
+        <mc:Fallback>
+          <p:sp>
+            <p:nvSpPr>
+              <p:cNvPr id="3" name="Content Placeholder 2">
+                <a:extLst>
+                  <a:ext uri="{FF2B5EF4-FFF2-40B4-BE49-F238E27FC236}">
+                    <a16:creationId xmlns:a16="http://schemas.microsoft.com/office/drawing/2014/main" id="{21E4BAD3-9F37-C24F-85AB-B98D274A5BDC}"/>
+                  </a:ext>
+                </a:extLst>
+              </p:cNvPr>
+              <p:cNvSpPr>
+                <a:spLocks noGrp="1" noRot="1" noChangeAspect="1" noMove="1" noResize="1" noEditPoints="1" noAdjustHandles="1" noChangeArrowheads="1" noChangeShapeType="1" noTextEdit="1"/>
+              </p:cNvSpPr>
+              <p:nvPr>
+                <p:ph idx="1"/>
+              </p:nvPr>
+            </p:nvSpPr>
+            <p:spPr>
+              <a:xfrm>
+                <a:off x="562131" y="1255999"/>
+                <a:ext cx="10972800" cy="5602001"/>
+              </a:xfrm>
+              <a:blipFill>
+                <a:blip r:embed="rId2"/>
+                <a:stretch>
+                  <a:fillRect l="-925" t="-1810"/>
+                </a:stretch>
+              </a:blipFill>
+            </p:spPr>
+            <p:txBody>
+              <a:bodyPr/>
+              <a:lstStyle/>
+              <a:p>
+                <a:r>
+                  <a:rPr lang="en-GB">
+                    <a:noFill/>
+                  </a:rPr>
+                  <a:t> </a:t>
+                </a:r>
+              </a:p>
+            </p:txBody>
+          </p:sp>
+        </mc:Fallback>
+      </mc:AlternateContent>
+    </p:spTree>
+    <p:extLst>
+      <p:ext uri="{BB962C8B-B14F-4D97-AF65-F5344CB8AC3E}">
+        <p14:creationId xmlns:p14="http://schemas.microsoft.com/office/powerpoint/2010/main" val="1177492152"/>
       </p:ext>
     </p:extLst>
   </p:cSld>
@@ -3968,4 +5001,299 @@
     </a:ext>
   </a:extLst>
 </a:theme>
+</file>
+
+<file path=ppt/theme/theme2.xml><?xml version="1.0" encoding="utf-8"?>
+<a:theme xmlns:a="http://schemas.openxmlformats.org/drawingml/2006/main" name="Office Theme">
+  <a:themeElements>
+    <a:clrScheme name="Office">
+      <a:dk1>
+        <a:sysClr val="windowText" lastClr="000000"/>
+      </a:dk1>
+      <a:lt1>
+        <a:sysClr val="window" lastClr="FFFFFF"/>
+      </a:lt1>
+      <a:dk2>
+        <a:srgbClr val="44546A"/>
+      </a:dk2>
+      <a:lt2>
+        <a:srgbClr val="E7E6E6"/>
+      </a:lt2>
+      <a:accent1>
+        <a:srgbClr val="4472C4"/>
+      </a:accent1>
+      <a:accent2>
+        <a:srgbClr val="ED7D31"/>
+      </a:accent2>
+      <a:accent3>
+        <a:srgbClr val="A5A5A5"/>
+      </a:accent3>
+      <a:accent4>
+        <a:srgbClr val="FFC000"/>
+      </a:accent4>
+      <a:accent5>
+        <a:srgbClr val="5B9BD5"/>
+      </a:accent5>
+      <a:accent6>
+        <a:srgbClr val="70AD47"/>
+      </a:accent6>
+      <a:hlink>
+        <a:srgbClr val="0563C1"/>
+      </a:hlink>
+      <a:folHlink>
+        <a:srgbClr val="954F72"/>
+      </a:folHlink>
+    </a:clrScheme>
+    <a:fontScheme name="Office">
+      <a:majorFont>
+        <a:latin typeface="Calibri Light" panose="020F0302020204030204"/>
+        <a:ea typeface=""/>
+        <a:cs typeface=""/>
+        <a:font script="Jpan" typeface="游ゴシック Light"/>
+        <a:font script="Hang" typeface="맑은 고딕"/>
+        <a:font script="Hans" typeface="等线 Light"/>
+        <a:font script="Hant" typeface="新細明體"/>
+        <a:font script="Arab" typeface="Times New Roman"/>
+        <a:font script="Hebr" typeface="Times New Roman"/>
+        <a:font script="Thai" typeface="Angsana New"/>
+        <a:font script="Ethi" typeface="Nyala"/>
+        <a:font script="Beng" typeface="Vrinda"/>
+        <a:font script="Gujr" typeface="Shruti"/>
+        <a:font script="Khmr" typeface="MoolBoran"/>
+        <a:font script="Knda" typeface="Tunga"/>
+        <a:font script="Guru" typeface="Raavi"/>
+        <a:font script="Cans" typeface="Euphemia"/>
+        <a:font script="Cher" typeface="Plantagenet Cherokee"/>
+        <a:font script="Yiii" typeface="Microsoft Yi Baiti"/>
+        <a:font script="Tibt" typeface="Microsoft Himalaya"/>
+        <a:font script="Thaa" typeface="MV Boli"/>
+        <a:font script="Deva" typeface="Mangal"/>
+        <a:font script="Telu" typeface="Gautami"/>
+        <a:font script="Taml" typeface="Latha"/>
+        <a:font script="Syrc" typeface="Estrangelo Edessa"/>
+        <a:font script="Orya" typeface="Kalinga"/>
+        <a:font script="Mlym" typeface="Kartika"/>
+        <a:font script="Laoo" typeface="DokChampa"/>
+        <a:font script="Sinh" typeface="Iskoola Pota"/>
+        <a:font script="Mong" typeface="Mongolian Baiti"/>
+        <a:font script="Viet" typeface="Times New Roman"/>
+        <a:font script="Uigh" typeface="Microsoft Uighur"/>
+        <a:font script="Geor" typeface="Sylfaen"/>
+        <a:font script="Armn" typeface="Arial"/>
+        <a:font script="Bugi" typeface="Leelawadee UI"/>
+        <a:font script="Bopo" typeface="Microsoft JhengHei"/>
+        <a:font script="Java" typeface="Javanese Text"/>
+        <a:font script="Lisu" typeface="Segoe UI"/>
+        <a:font script="Mymr" typeface="Myanmar Text"/>
+        <a:font script="Nkoo" typeface="Ebrima"/>
+        <a:font script="Olck" typeface="Nirmala UI"/>
+        <a:font script="Osma" typeface="Ebrima"/>
+        <a:font script="Phag" typeface="Phagspa"/>
+        <a:font script="Syrn" typeface="Estrangelo Edessa"/>
+        <a:font script="Syrj" typeface="Estrangelo Edessa"/>
+        <a:font script="Syre" typeface="Estrangelo Edessa"/>
+        <a:font script="Sora" typeface="Nirmala UI"/>
+        <a:font script="Tale" typeface="Microsoft Tai Le"/>
+        <a:font script="Talu" typeface="Microsoft New Tai Lue"/>
+        <a:font script="Tfng" typeface="Ebrima"/>
+      </a:majorFont>
+      <a:minorFont>
+        <a:latin typeface="Calibri" panose="020F0502020204030204"/>
+        <a:ea typeface=""/>
+        <a:cs typeface=""/>
+        <a:font script="Jpan" typeface="游ゴシック"/>
+        <a:font script="Hang" typeface="맑은 고딕"/>
+        <a:font script="Hans" typeface="等线"/>
+        <a:font script="Hant" typeface="新細明體"/>
+        <a:font script="Arab" typeface="Arial"/>
+        <a:font script="Hebr" typeface="Arial"/>
+        <a:font script="Thai" typeface="Cordia New"/>
+        <a:font script="Ethi" typeface="Nyala"/>
+        <a:font script="Beng" typeface="Vrinda"/>
+        <a:font script="Gujr" typeface="Shruti"/>
+        <a:font script="Khmr" typeface="DaunPenh"/>
+        <a:font script="Knda" typeface="Tunga"/>
+        <a:font script="Guru" typeface="Raavi"/>
+        <a:font script="Cans" typeface="Euphemia"/>
+        <a:font script="Cher" typeface="Plantagenet Cherokee"/>
+        <a:font script="Yiii" typeface="Microsoft Yi Baiti"/>
+        <a:font script="Tibt" typeface="Microsoft Himalaya"/>
+        <a:font script="Thaa" typeface="MV Boli"/>
+        <a:font script="Deva" typeface="Mangal"/>
+        <a:font script="Telu" typeface="Gautami"/>
+        <a:font script="Taml" typeface="Latha"/>
+        <a:font script="Syrc" typeface="Estrangelo Edessa"/>
+        <a:font script="Orya" typeface="Kalinga"/>
+        <a:font script="Mlym" typeface="Kartika"/>
+        <a:font script="Laoo" typeface="DokChampa"/>
+        <a:font script="Sinh" typeface="Iskoola Pota"/>
+        <a:font script="Mong" typeface="Mongolian Baiti"/>
+        <a:font script="Viet" typeface="Arial"/>
+        <a:font script="Uigh" typeface="Microsoft Uighur"/>
+        <a:font script="Geor" typeface="Sylfaen"/>
+        <a:font script="Armn" typeface="Arial"/>
+        <a:font script="Bugi" typeface="Leelawadee UI"/>
+        <a:font script="Bopo" typeface="Microsoft JhengHei"/>
+        <a:font script="Java" typeface="Javanese Text"/>
+        <a:font script="Lisu" typeface="Segoe UI"/>
+        <a:font script="Mymr" typeface="Myanmar Text"/>
+        <a:font script="Nkoo" typeface="Ebrima"/>
+        <a:font script="Olck" typeface="Nirmala UI"/>
+        <a:font script="Osma" typeface="Ebrima"/>
+        <a:font script="Phag" typeface="Phagspa"/>
+        <a:font script="Syrn" typeface="Estrangelo Edessa"/>
+        <a:font script="Syrj" typeface="Estrangelo Edessa"/>
+        <a:font script="Syre" typeface="Estrangelo Edessa"/>
+        <a:font script="Sora" typeface="Nirmala UI"/>
+        <a:font script="Tale" typeface="Microsoft Tai Le"/>
+        <a:font script="Talu" typeface="Microsoft New Tai Lue"/>
+        <a:font script="Tfng" typeface="Ebrima"/>
+      </a:minorFont>
+    </a:fontScheme>
+    <a:fmtScheme name="Office">
+      <a:fillStyleLst>
+        <a:solidFill>
+          <a:schemeClr val="phClr"/>
+        </a:solidFill>
+        <a:gradFill rotWithShape="1">
+          <a:gsLst>
+            <a:gs pos="0">
+              <a:schemeClr val="phClr">
+                <a:lumMod val="110000"/>
+                <a:satMod val="105000"/>
+                <a:tint val="67000"/>
+              </a:schemeClr>
+            </a:gs>
+            <a:gs pos="50000">
+              <a:schemeClr val="phClr">
+                <a:lumMod val="105000"/>
+                <a:satMod val="103000"/>
+                <a:tint val="73000"/>
+              </a:schemeClr>
+            </a:gs>
+            <a:gs pos="100000">
+              <a:schemeClr val="phClr">
+                <a:lumMod val="105000"/>
+                <a:satMod val="109000"/>
+                <a:tint val="81000"/>
+              </a:schemeClr>
+            </a:gs>
+          </a:gsLst>
+          <a:lin ang="5400000" scaled="0"/>
+        </a:gradFill>
+        <a:gradFill rotWithShape="1">
+          <a:gsLst>
+            <a:gs pos="0">
+              <a:schemeClr val="phClr">
+                <a:satMod val="103000"/>
+                <a:lumMod val="102000"/>
+                <a:tint val="94000"/>
+              </a:schemeClr>
+            </a:gs>
+            <a:gs pos="50000">
+              <a:schemeClr val="phClr">
+                <a:satMod val="110000"/>
+                <a:lumMod val="100000"/>
+                <a:shade val="100000"/>
+              </a:schemeClr>
+            </a:gs>
+            <a:gs pos="100000">
+              <a:schemeClr val="phClr">
+                <a:lumMod val="99000"/>
+                <a:satMod val="120000"/>
+                <a:shade val="78000"/>
+              </a:schemeClr>
+            </a:gs>
+          </a:gsLst>
+          <a:lin ang="5400000" scaled="0"/>
+        </a:gradFill>
+      </a:fillStyleLst>
+      <a:lnStyleLst>
+        <a:ln w="6350" cap="flat" cmpd="sng" algn="ctr">
+          <a:solidFill>
+            <a:schemeClr val="phClr"/>
+          </a:solidFill>
+          <a:prstDash val="solid"/>
+          <a:miter lim="800000"/>
+        </a:ln>
+        <a:ln w="12700" cap="flat" cmpd="sng" algn="ctr">
+          <a:solidFill>
+            <a:schemeClr val="phClr"/>
+          </a:solidFill>
+          <a:prstDash val="solid"/>
+          <a:miter lim="800000"/>
+        </a:ln>
+        <a:ln w="19050" cap="flat" cmpd="sng" algn="ctr">
+          <a:solidFill>
+            <a:schemeClr val="phClr"/>
+          </a:solidFill>
+          <a:prstDash val="solid"/>
+          <a:miter lim="800000"/>
+        </a:ln>
+      </a:lnStyleLst>
+      <a:effectStyleLst>
+        <a:effectStyle>
+          <a:effectLst/>
+        </a:effectStyle>
+        <a:effectStyle>
+          <a:effectLst/>
+        </a:effectStyle>
+        <a:effectStyle>
+          <a:effectLst>
+            <a:outerShdw blurRad="57150" dist="19050" dir="5400000" algn="ctr" rotWithShape="0">
+              <a:srgbClr val="000000">
+                <a:alpha val="63000"/>
+              </a:srgbClr>
+            </a:outerShdw>
+          </a:effectLst>
+        </a:effectStyle>
+      </a:effectStyleLst>
+      <a:bgFillStyleLst>
+        <a:solidFill>
+          <a:schemeClr val="phClr"/>
+        </a:solidFill>
+        <a:solidFill>
+          <a:schemeClr val="phClr">
+            <a:tint val="95000"/>
+            <a:satMod val="170000"/>
+          </a:schemeClr>
+        </a:solidFill>
+        <a:gradFill rotWithShape="1">
+          <a:gsLst>
+            <a:gs pos="0">
+              <a:schemeClr val="phClr">
+                <a:tint val="93000"/>
+                <a:satMod val="150000"/>
+                <a:shade val="98000"/>
+                <a:lumMod val="102000"/>
+              </a:schemeClr>
+            </a:gs>
+            <a:gs pos="50000">
+              <a:schemeClr val="phClr">
+                <a:tint val="98000"/>
+                <a:satMod val="130000"/>
+                <a:shade val="90000"/>
+                <a:lumMod val="103000"/>
+              </a:schemeClr>
+            </a:gs>
+            <a:gs pos="100000">
+              <a:schemeClr val="phClr">
+                <a:shade val="63000"/>
+                <a:satMod val="120000"/>
+              </a:schemeClr>
+            </a:gs>
+          </a:gsLst>
+          <a:lin ang="5400000" scaled="0"/>
+        </a:gradFill>
+      </a:bgFillStyleLst>
+    </a:fmtScheme>
+  </a:themeElements>
+  <a:objectDefaults/>
+  <a:extraClrSchemeLst/>
+  <a:extLst>
+    <a:ext uri="{05A4C25C-085E-4340-85A3-A5531E510DB2}">
+      <thm15:themeFamily xmlns:thm15="http://schemas.microsoft.com/office/thememl/2012/main" name="Office Theme" id="{62F939B6-93AF-4DB8-9C6B-D6C7DFDC589F}" vid="{4A3C46E8-61CC-4603-A589-7422A47A8E4A}"/>
+    </a:ext>
+  </a:extLst>
+</a:theme>
 </file>
</xml_diff>